<commit_message>
pptx - slide #1
</commit_message>
<xml_diff>
--- a/pkls_n_debugging/testing/השוואת כלל הארץ, מחוז דרום, לשכת אופקים.pptx
+++ b/pkls_n_debugging/testing/השוואת כלל הארץ, מחוז דרום, לשכת אופקים.pptx
@@ -3157,8 +3157,13 @@
               <a:t>נתוני שירות התעסוקה</a:t>
             </a:r>
             <a:br/>
-            <a:r>
-              <a:t>השוואת כלל הארץ, מחוז דרום, לשכת אופקים</a:t>
+            <a:br/>
+            <a:r>
+              <a:t>השוואת כלל הארץ, מחוז דרום,</a:t>
+            </a:r>
+            <a:br/>
+            <a:r>
+              <a:t>לשכת אופקים</a:t>
             </a:r>
           </a:p>
         </p:txBody>

</xml_diff>

<commit_message>
pptx - new_body_slide function
</commit_message>
<xml_diff>
--- a/pkls_n_debugging/testing/השוואת כלל הארץ, מחוז דרום, לשכת אופקים.pptx
+++ b/pkls_n_debugging/testing/השוואת כלל הארץ, מחוז דרום, לשכת אופקים.pptx
@@ -3156,21 +3156,58 @@
             <a:r>
               <a:t>נתוני שירות התעסוקה</a:t>
             </a:r>
+          </a:p>
+        </p:txBody>
+      </p:sp>
+      <p:sp>
+        <p:nvSpPr>
+          <p:cNvPr id="4" name="TextBox 3"/>
+          <p:cNvSpPr txBox="1"/>
+          <p:nvPr/>
+        </p:nvSpPr>
+        <p:spPr>
+          <a:xfrm>
+            <a:off x="10515600" y="3657600"/>
+            <a:ext cx="3657600" cy="1828800"/>
+          </a:xfrm>
+          <a:prstGeom prst="rect">
+            <a:avLst/>
+          </a:prstGeom>
+          <a:noFill/>
+        </p:spPr>
+        <p:txBody>
+          <a:bodyPr wrap="none">
+            <a:spAutoFit/>
+          </a:bodyPr>
+          <a:lstStyle/>
+          <a:p/>
+          <a:p>
+            <a:pPr algn="r">
+              <a:defRPr sz="4000" b="1">
+                <a:solidFill>
+                  <a:srgbClr val="FFFFFF"/>
+                </a:solidFill>
+                <a:latin typeface="Ariel"/>
+              </a:defRPr>
+            </a:pPr>
+            <a:r>
+              <a:t>כלל הארץ</a:t>
+            </a:r>
             <a:br/>
+            <a:r>
+              <a:t>מחוז דרום</a:t>
+            </a:r>
             <a:br/>
             <a:r>
-              <a:t>השוואת כלל הארץ, מחוז דרום,</a:t>
+              <a:t>לשכת אופקים</a:t>
             </a:r>
             <a:br/>
-            <a:r>
-              <a:t>לשכת אופקים</a:t>
-            </a:r>
-          </a:p>
-        </p:txBody>
-      </p:sp>
-      <p:sp>
-        <p:nvSpPr>
-          <p:cNvPr id="4" name="TextBox 3"/>
+          </a:p>
+        </p:txBody>
+      </p:sp>
+      <p:sp>
+        <p:nvSpPr>
+          <p:cNvPr id="5" name="TextBox 4"/>
           <p:cNvSpPr txBox="1"/>
           <p:nvPr/>
         </p:nvSpPr>
@@ -3197,7 +3234,7 @@
               </a:defRPr>
             </a:pPr>
             <a:r>
-              <a:t>12/09/2021</a:t>
+              <a:t>13/09/2021</a:t>
             </a:r>
           </a:p>
         </p:txBody>
@@ -4153,7 +4190,7 @@
         </p:nvSpPr>
         <p:spPr>
           <a:xfrm>
-            <a:off x="5943600" y="91440"/>
+            <a:off x="6858000" y="91440"/>
             <a:ext cx="7315200" cy="914400"/>
           </a:xfrm>
           <a:prstGeom prst="rect">

</xml_diff>

<commit_message>
pptx - slide #4
</commit_message>
<xml_diff>
--- a/pkls_n_debugging/testing/השוואת כלל הארץ, מחוז דרום, לשכת אופקים.pptx
+++ b/pkls_n_debugging/testing/השוואת כלל הארץ, מחוז דרום, לשכת אופקים.pptx
@@ -13,9 +13,6 @@
     <p:sldId id="261" r:id="rId12"/>
     <p:sldId id="262" r:id="rId13"/>
     <p:sldId id="263" r:id="rId14"/>
-    <p:sldId id="264" r:id="rId15"/>
-    <p:sldId id="265" r:id="rId16"/>
-    <p:sldId id="266" r:id="rId17"/>
   </p:sldIdLst>
   <p:sldSz cx="14630400" cy="8229600" type="screen4x3"/>
   <p:notesSz cx="6858000" cy="9144000"/>
@@ -3100,165 +3097,6 @@
       <p:grpSpPr/>
       <p:pic>
         <p:nvPicPr>
-          <p:cNvPr id="2" name="Picture 1" descr="bck_first_slide.png"/>
-          <p:cNvPicPr>
-            <a:picLocks noChangeAspect="1"/>
-          </p:cNvPicPr>
-          <p:nvPr/>
-        </p:nvPicPr>
-        <p:blipFill>
-          <a:blip r:embed="rId2"/>
-          <a:stretch>
-            <a:fillRect/>
-          </a:stretch>
-        </p:blipFill>
-        <p:spPr>
-          <a:xfrm>
-            <a:off x="0" y="0"/>
-            <a:ext cx="14630400" cy="8229600"/>
-          </a:xfrm>
-          <a:prstGeom prst="rect">
-            <a:avLst/>
-          </a:prstGeom>
-        </p:spPr>
-      </p:pic>
-      <p:sp>
-        <p:nvSpPr>
-          <p:cNvPr id="3" name="TextBox 2"/>
-          <p:cNvSpPr txBox="1"/>
-          <p:nvPr/>
-        </p:nvSpPr>
-        <p:spPr>
-          <a:xfrm>
-            <a:off x="10515600" y="1828800"/>
-            <a:ext cx="3657600" cy="1828800"/>
-          </a:xfrm>
-          <a:prstGeom prst="rect">
-            <a:avLst/>
-          </a:prstGeom>
-          <a:noFill/>
-        </p:spPr>
-        <p:txBody>
-          <a:bodyPr wrap="none">
-            <a:spAutoFit/>
-          </a:bodyPr>
-          <a:lstStyle/>
-          <a:p/>
-          <a:p>
-            <a:pPr algn="r">
-              <a:defRPr sz="6400" b="1">
-                <a:solidFill>
-                  <a:srgbClr val="FFFFFF"/>
-                </a:solidFill>
-                <a:latin typeface="Ariel"/>
-              </a:defRPr>
-            </a:pPr>
-            <a:r>
-              <a:t>נתוני שירות התעסוקה</a:t>
-            </a:r>
-          </a:p>
-        </p:txBody>
-      </p:sp>
-      <p:sp>
-        <p:nvSpPr>
-          <p:cNvPr id="4" name="TextBox 3"/>
-          <p:cNvSpPr txBox="1"/>
-          <p:nvPr/>
-        </p:nvSpPr>
-        <p:spPr>
-          <a:xfrm>
-            <a:off x="10515600" y="3657600"/>
-            <a:ext cx="3657600" cy="1828800"/>
-          </a:xfrm>
-          <a:prstGeom prst="rect">
-            <a:avLst/>
-          </a:prstGeom>
-          <a:noFill/>
-        </p:spPr>
-        <p:txBody>
-          <a:bodyPr wrap="none">
-            <a:spAutoFit/>
-          </a:bodyPr>
-          <a:lstStyle/>
-          <a:p/>
-          <a:p>
-            <a:pPr algn="r">
-              <a:defRPr sz="4000" b="1">
-                <a:solidFill>
-                  <a:srgbClr val="FFFFFF"/>
-                </a:solidFill>
-                <a:latin typeface="Ariel"/>
-              </a:defRPr>
-            </a:pPr>
-            <a:r>
-              <a:t>כלל הארץ</a:t>
-            </a:r>
-            <a:br/>
-            <a:r>
-              <a:t>מחוז דרום</a:t>
-            </a:r>
-            <a:br/>
-            <a:r>
-              <a:t>לשכת אופקים</a:t>
-            </a:r>
-            <a:br/>
-          </a:p>
-        </p:txBody>
-      </p:sp>
-      <p:sp>
-        <p:nvSpPr>
-          <p:cNvPr id="5" name="TextBox 4"/>
-          <p:cNvSpPr txBox="1"/>
-          <p:nvPr/>
-        </p:nvSpPr>
-        <p:spPr>
-          <a:xfrm>
-            <a:off x="10789920" y="7269480"/>
-            <a:ext cx="3657600" cy="1828800"/>
-          </a:xfrm>
-          <a:prstGeom prst="rect">
-            <a:avLst/>
-          </a:prstGeom>
-          <a:noFill/>
-        </p:spPr>
-        <p:txBody>
-          <a:bodyPr wrap="none">
-            <a:spAutoFit/>
-          </a:bodyPr>
-          <a:lstStyle/>
-          <a:p/>
-          <a:p>
-            <a:pPr algn="r">
-              <a:defRPr sz="3500" b="1">
-                <a:latin typeface="Ariel"/>
-              </a:defRPr>
-            </a:pPr>
-            <a:r>
-              <a:t>13/09/2021</a:t>
-            </a:r>
-          </a:p>
-        </p:txBody>
-      </p:sp>
-    </p:spTree>
-  </p:cSld>
-  <p:clrMapOvr>
-    <a:masterClrMapping/>
-  </p:clrMapOvr>
-</p:sld>
-</file>
-
-<file path=ppt/slides/slide10.xml><?xml version="1.0" encoding="utf-8"?>
-<p:sld xmlns:a="http://schemas.openxmlformats.org/drawingml/2006/main" xmlns:p="http://schemas.openxmlformats.org/presentationml/2006/main" xmlns:r="http://schemas.openxmlformats.org/officeDocument/2006/relationships">
-  <p:cSld>
-    <p:spTree>
-      <p:nvGrpSpPr>
-        <p:cNvPr id="1" name=""/>
-        <p:cNvGrpSpPr/>
-        <p:nvPr/>
-      </p:nvGrpSpPr>
-      <p:grpSpPr/>
-      <p:pic>
-        <p:nvPicPr>
           <p:cNvPr id="2" name="Picture 1" descr="bck_all_slide.png"/>
           <p:cNvPicPr>
             <a:picLocks noChangeAspect="1"/>
@@ -3313,538 +3151,14 @@
               </a:defRPr>
             </a:pPr>
             <a:r>
-              <a:t>מקצועות שכיחים בלשכת אופקים</a:t>
-            </a:r>
-          </a:p>
-        </p:txBody>
-      </p:sp>
-      <p:graphicFrame>
-        <p:nvGraphicFramePr>
-          <p:cNvPr id="4" name="Table 3"/>
-          <p:cNvGraphicFramePr>
-            <a:graphicFrameLocks noGrp="1"/>
-          </p:cNvGraphicFramePr>
-          <p:nvPr/>
-        </p:nvGraphicFramePr>
-        <p:xfrm>
-          <a:off x="4572000" y="1828800"/>
-          <a:ext cx="5486400" cy="1371600"/>
-        </p:xfrm>
-        <a:graphic>
-          <a:graphicData uri="http://schemas.openxmlformats.org/drawingml/2006/table">
-            <a:tbl>
-              <a:tblPr firstRow="1" bandRow="1">
-                <a:tableStyleId>{5C22544A-7EE6-4342-B048-85BDC9FD1C3A}</a:tableStyleId>
-              </a:tblPr>
-              <a:tblGrid>
-                <a:gridCol w="1828800"/>
-                <a:gridCol w="1828800"/>
-                <a:gridCol w="1828800"/>
-              </a:tblGrid>
-              <a:tr h="124690">
-                <a:tc>
-                  <a:txBody>
-                    <a:bodyPr/>
-                    <a:lstStyle/>
-                    <a:p>
-                      <a:r>
-                        <a:t>כמות דרישות</a:t>
-                      </a:r>
-                    </a:p>
-                  </a:txBody>
-                  <a:tcPr/>
-                </a:tc>
-                <a:tc>
-                  <a:txBody>
-                    <a:bodyPr/>
-                    <a:lstStyle/>
-                    <a:p>
-                      <a:r>
-                        <a:t>שם המקצוע</a:t>
-                      </a:r>
-                    </a:p>
-                  </a:txBody>
-                  <a:tcPr/>
-                </a:tc>
-                <a:tc>
-                  <a:txBody>
-                    <a:bodyPr/>
-                    <a:lstStyle/>
-                    <a:p>
-                      <a:r>
-                        <a:t>דירוג</a:t>
-                      </a:r>
-                    </a:p>
-                  </a:txBody>
-                  <a:tcPr/>
-                </a:tc>
-              </a:tr>
-              <a:tr h="124690">
-                <a:tc>
-                  <a:txBody>
-                    <a:bodyPr/>
-                    <a:lstStyle/>
-                    <a:p>
-                      <a:r>
-                        <a:t>424</a:t>
-                      </a:r>
-                    </a:p>
-                  </a:txBody>
-                  <a:tcPr/>
-                </a:tc>
-                <a:tc>
-                  <a:txBody>
-                    <a:bodyPr/>
-                    <a:lstStyle/>
-                    <a:p>
-                      <a:r>
-                        <a:t>לא ידוע</a:t>
-                      </a:r>
-                    </a:p>
-                  </a:txBody>
-                  <a:tcPr/>
-                </a:tc>
-                <a:tc>
-                  <a:txBody>
-                    <a:bodyPr/>
-                    <a:lstStyle/>
-                    <a:p>
-                      <a:r>
-                        <a:t>1</a:t>
-                      </a:r>
-                    </a:p>
-                  </a:txBody>
-                  <a:tcPr/>
-                </a:tc>
-              </a:tr>
-              <a:tr h="124690">
-                <a:tc>
-                  <a:txBody>
-                    <a:bodyPr/>
-                    <a:lstStyle/>
-                    <a:p>
-                      <a:r>
-                        <a:t>281</a:t>
-                      </a:r>
-                    </a:p>
-                  </a:txBody>
-                  <a:tcPr/>
-                </a:tc>
-                <a:tc>
-                  <a:txBody>
-                    <a:bodyPr/>
-                    <a:lstStyle/>
-                    <a:p>
-                      <a:r>
-                        <a:t>סייע/ת / מטפל/ת</a:t>
-                      </a:r>
-                    </a:p>
-                  </a:txBody>
-                  <a:tcPr/>
-                </a:tc>
-                <a:tc>
-                  <a:txBody>
-                    <a:bodyPr/>
-                    <a:lstStyle/>
-                    <a:p>
-                      <a:r>
-                        <a:t>2</a:t>
-                      </a:r>
-                    </a:p>
-                  </a:txBody>
-                  <a:tcPr/>
-                </a:tc>
-              </a:tr>
-              <a:tr h="124690">
-                <a:tc>
-                  <a:txBody>
-                    <a:bodyPr/>
-                    <a:lstStyle/>
-                    <a:p>
-                      <a:r>
-                        <a:t>273</a:t>
-                      </a:r>
-                    </a:p>
-                  </a:txBody>
-                  <a:tcPr/>
-                </a:tc>
-                <a:tc>
-                  <a:txBody>
-                    <a:bodyPr/>
-                    <a:lstStyle/>
-                    <a:p>
-                      <a:r>
-                        <a:t>עובד/ת לא מקצועי</a:t>
-                      </a:r>
-                    </a:p>
-                  </a:txBody>
-                  <a:tcPr/>
-                </a:tc>
-                <a:tc>
-                  <a:txBody>
-                    <a:bodyPr/>
-                    <a:lstStyle/>
-                    <a:p>
-                      <a:r>
-                        <a:t>3</a:t>
-                      </a:r>
-                    </a:p>
-                  </a:txBody>
-                  <a:tcPr/>
-                </a:tc>
-              </a:tr>
-              <a:tr h="124690">
-                <a:tc>
-                  <a:txBody>
-                    <a:bodyPr/>
-                    <a:lstStyle/>
-                    <a:p>
-                      <a:r>
-                        <a:t>201</a:t>
-                      </a:r>
-                    </a:p>
-                  </a:txBody>
-                  <a:tcPr/>
-                </a:tc>
-                <a:tc>
-                  <a:txBody>
-                    <a:bodyPr/>
-                    <a:lstStyle/>
-                    <a:p>
-                      <a:r>
-                        <a:t>מזכיר/ה</a:t>
-                      </a:r>
-                    </a:p>
-                  </a:txBody>
-                  <a:tcPr/>
-                </a:tc>
-                <a:tc>
-                  <a:txBody>
-                    <a:bodyPr/>
-                    <a:lstStyle/>
-                    <a:p>
-                      <a:r>
-                        <a:t>4</a:t>
-                      </a:r>
-                    </a:p>
-                  </a:txBody>
-                  <a:tcPr/>
-                </a:tc>
-              </a:tr>
-              <a:tr h="124690">
-                <a:tc>
-                  <a:txBody>
-                    <a:bodyPr/>
-                    <a:lstStyle/>
-                    <a:p>
-                      <a:r>
-                        <a:t>180</a:t>
-                      </a:r>
-                    </a:p>
-                  </a:txBody>
-                  <a:tcPr/>
-                </a:tc>
-                <a:tc>
-                  <a:txBody>
-                    <a:bodyPr/>
-                    <a:lstStyle/>
-                    <a:p>
-                      <a:r>
-                        <a:t>מטפל/ת סיעודי/ת / מט"ב</a:t>
-                      </a:r>
-                    </a:p>
-                  </a:txBody>
-                  <a:tcPr/>
-                </a:tc>
-                <a:tc>
-                  <a:txBody>
-                    <a:bodyPr/>
-                    <a:lstStyle/>
-                    <a:p>
-                      <a:r>
-                        <a:t>5</a:t>
-                      </a:r>
-                    </a:p>
-                  </a:txBody>
-                  <a:tcPr/>
-                </a:tc>
-              </a:tr>
-              <a:tr h="124690">
-                <a:tc>
-                  <a:txBody>
-                    <a:bodyPr/>
-                    <a:lstStyle/>
-                    <a:p>
-                      <a:r>
-                        <a:t>167</a:t>
-                      </a:r>
-                    </a:p>
-                  </a:txBody>
-                  <a:tcPr/>
-                </a:tc>
-                <a:tc>
-                  <a:txBody>
-                    <a:bodyPr/>
-                    <a:lstStyle/>
-                    <a:p>
-                      <a:r>
-                        <a:t>פקיד/ה כללי</a:t>
-                      </a:r>
-                    </a:p>
-                  </a:txBody>
-                  <a:tcPr/>
-                </a:tc>
-                <a:tc>
-                  <a:txBody>
-                    <a:bodyPr/>
-                    <a:lstStyle/>
-                    <a:p>
-                      <a:r>
-                        <a:t>6</a:t>
-                      </a:r>
-                    </a:p>
-                  </a:txBody>
-                  <a:tcPr/>
-                </a:tc>
-              </a:tr>
-              <a:tr h="124690">
-                <a:tc>
-                  <a:txBody>
-                    <a:bodyPr/>
-                    <a:lstStyle/>
-                    <a:p>
-                      <a:r>
-                        <a:t>166</a:t>
-                      </a:r>
-                    </a:p>
-                  </a:txBody>
-                  <a:tcPr/>
-                </a:tc>
-                <a:tc>
-                  <a:txBody>
-                    <a:bodyPr/>
-                    <a:lstStyle/>
-                    <a:p>
-                      <a:r>
-                        <a:t>עובד/ת ניקיון</a:t>
-                      </a:r>
-                    </a:p>
-                  </a:txBody>
-                  <a:tcPr/>
-                </a:tc>
-                <a:tc>
-                  <a:txBody>
-                    <a:bodyPr/>
-                    <a:lstStyle/>
-                    <a:p>
-                      <a:r>
-                        <a:t>7</a:t>
-                      </a:r>
-                    </a:p>
-                  </a:txBody>
-                  <a:tcPr/>
-                </a:tc>
-              </a:tr>
-              <a:tr h="124690">
-                <a:tc>
-                  <a:txBody>
-                    <a:bodyPr/>
-                    <a:lstStyle/>
-                    <a:p>
-                      <a:r>
-                        <a:t>158</a:t>
-                      </a:r>
-                    </a:p>
-                  </a:txBody>
-                  <a:tcPr/>
-                </a:tc>
-                <a:tc>
-                  <a:txBody>
-                    <a:bodyPr/>
-                    <a:lstStyle/>
-                    <a:p>
-                      <a:r>
-                        <a:t>עובד/ת ייצור כללי</a:t>
-                      </a:r>
-                    </a:p>
-                  </a:txBody>
-                  <a:tcPr/>
-                </a:tc>
-                <a:tc>
-                  <a:txBody>
-                    <a:bodyPr/>
-                    <a:lstStyle/>
-                    <a:p>
-                      <a:r>
-                        <a:t>8</a:t>
-                      </a:r>
-                    </a:p>
-                  </a:txBody>
-                  <a:tcPr/>
-                </a:tc>
-              </a:tr>
-              <a:tr h="124690">
-                <a:tc>
-                  <a:txBody>
-                    <a:bodyPr/>
-                    <a:lstStyle/>
-                    <a:p>
-                      <a:r>
-                        <a:t>150</a:t>
-                      </a:r>
-                    </a:p>
-                  </a:txBody>
-                  <a:tcPr/>
-                </a:tc>
-                <a:tc>
-                  <a:txBody>
-                    <a:bodyPr/>
-                    <a:lstStyle/>
-                    <a:p>
-                      <a:r>
-                        <a:t>מורה</a:t>
-                      </a:r>
-                    </a:p>
-                  </a:txBody>
-                  <a:tcPr/>
-                </a:tc>
-                <a:tc>
-                  <a:txBody>
-                    <a:bodyPr/>
-                    <a:lstStyle/>
-                    <a:p>
-                      <a:r>
-                        <a:t>9</a:t>
-                      </a:r>
-                    </a:p>
-                  </a:txBody>
-                  <a:tcPr/>
-                </a:tc>
-              </a:tr>
-              <a:tr h="124700">
-                <a:tc>
-                  <a:txBody>
-                    <a:bodyPr/>
-                    <a:lstStyle/>
-                    <a:p>
-                      <a:r>
-                        <a:t>145</a:t>
-                      </a:r>
-                    </a:p>
-                  </a:txBody>
-                  <a:tcPr/>
-                </a:tc>
-                <a:tc>
-                  <a:txBody>
-                    <a:bodyPr/>
-                    <a:lstStyle/>
-                    <a:p>
-                      <a:r>
-                        <a:t>מוכר/ת</a:t>
-                      </a:r>
-                    </a:p>
-                  </a:txBody>
-                  <a:tcPr/>
-                </a:tc>
-                <a:tc>
-                  <a:txBody>
-                    <a:bodyPr/>
-                    <a:lstStyle/>
-                    <a:p>
-                      <a:r>
-                        <a:t>10</a:t>
-                      </a:r>
-                    </a:p>
-                  </a:txBody>
-                  <a:tcPr/>
-                </a:tc>
-              </a:tr>
-            </a:tbl>
-          </a:graphicData>
-        </a:graphic>
-      </p:graphicFrame>
-    </p:spTree>
-  </p:cSld>
-  <p:clrMapOvr>
-    <a:masterClrMapping/>
-  </p:clrMapOvr>
-</p:sld>
-</file>
-
-<file path=ppt/slides/slide11.xml><?xml version="1.0" encoding="utf-8"?>
-<p:sld xmlns:a="http://schemas.openxmlformats.org/drawingml/2006/main" xmlns:p="http://schemas.openxmlformats.org/presentationml/2006/main" xmlns:r="http://schemas.openxmlformats.org/officeDocument/2006/relationships">
-  <p:cSld>
-    <p:spTree>
-      <p:nvGrpSpPr>
-        <p:cNvPr id="1" name=""/>
-        <p:cNvGrpSpPr/>
-        <p:nvPr/>
-      </p:nvGrpSpPr>
-      <p:grpSpPr/>
+              <a:t>התפלגות סיבת הרישום של דורשי עבודה לשירות</a:t>
+            </a:r>
+          </a:p>
+        </p:txBody>
+      </p:sp>
       <p:pic>
         <p:nvPicPr>
-          <p:cNvPr id="2" name="Picture 1" descr="bck_all_slide.png"/>
-          <p:cNvPicPr>
-            <a:picLocks noChangeAspect="1"/>
-          </p:cNvPicPr>
-          <p:nvPr/>
-        </p:nvPicPr>
-        <p:blipFill>
-          <a:blip r:embed="rId2"/>
-          <a:stretch>
-            <a:fillRect/>
-          </a:stretch>
-        </p:blipFill>
-        <p:spPr>
-          <a:xfrm>
-            <a:off x="0" y="0"/>
-            <a:ext cx="14630400" cy="8229600"/>
-          </a:xfrm>
-          <a:prstGeom prst="rect">
-            <a:avLst/>
-          </a:prstGeom>
-        </p:spPr>
-      </p:pic>
-      <p:sp>
-        <p:nvSpPr>
-          <p:cNvPr id="3" name="TextBox 2"/>
-          <p:cNvSpPr txBox="1"/>
-          <p:nvPr/>
-        </p:nvSpPr>
-        <p:spPr>
-          <a:xfrm>
-            <a:off x="6858000" y="91440"/>
-            <a:ext cx="7315200" cy="914400"/>
-          </a:xfrm>
-          <a:prstGeom prst="rect">
-            <a:avLst/>
-          </a:prstGeom>
-          <a:noFill/>
-        </p:spPr>
-        <p:txBody>
-          <a:bodyPr wrap="none">
-            <a:spAutoFit/>
-          </a:bodyPr>
-          <a:lstStyle/>
-          <a:p/>
-          <a:p>
-            <a:pPr algn="r">
-              <a:defRPr sz="3800" b="1">
-                <a:solidFill>
-                  <a:srgbClr val="FFFFFF"/>
-                </a:solidFill>
-                <a:latin typeface="Ariel"/>
-              </a:defRPr>
-            </a:pPr>
-            <a:r>
-              <a:t>התפלגות משלחי היד - מבט כללי</a:t>
-            </a:r>
-          </a:p>
-        </p:txBody>
-      </p:sp>
-      <p:pic>
-        <p:nvPicPr>
-          <p:cNvPr id="4" name="Picture 3" descr="גרף_מקצועות.png"/>
+          <p:cNvPr id="4" name="Picture 3" descr="גרף_סיבת_רישום.png"/>
           <p:cNvPicPr>
             <a:picLocks noChangeAspect="1"/>
           </p:cNvPicPr>
@@ -3858,8 +3172,69 @@
         </p:blipFill>
         <p:spPr>
           <a:xfrm>
-            <a:off x="1828800" y="1371600"/>
-            <a:ext cx="12527280" cy="7973713"/>
+            <a:off x="2743200" y="1280160"/>
+            <a:ext cx="10058400" cy="4579434"/>
+          </a:xfrm>
+          <a:prstGeom prst="rect">
+            <a:avLst/>
+          </a:prstGeom>
+        </p:spPr>
+      </p:pic>
+      <p:sp>
+        <p:nvSpPr>
+          <p:cNvPr id="5" name="TextBox 4"/>
+          <p:cNvSpPr txBox="1"/>
+          <p:nvPr/>
+        </p:nvSpPr>
+        <p:spPr>
+          <a:xfrm>
+            <a:off x="5486400" y="6858000"/>
+            <a:ext cx="9144000" cy="1371600"/>
+          </a:xfrm>
+          <a:prstGeom prst="rect">
+            <a:avLst/>
+          </a:prstGeom>
+          <a:noFill/>
+        </p:spPr>
+        <p:txBody>
+          <a:bodyPr wrap="none">
+            <a:spAutoFit/>
+          </a:bodyPr>
+          <a:lstStyle/>
+          <a:p/>
+          <a:p>
+            <a:pPr algn="r">
+              <a:defRPr sz="2500">
+                <a:solidFill>
+                  <a:srgbClr val="A9A9A9"/>
+                </a:solidFill>
+                <a:latin typeface="Ariel"/>
+              </a:defRPr>
+            </a:pPr>
+            <a:r>
+              <a:t>ניתן להכניס טקסט כאן</a:t>
+            </a:r>
+          </a:p>
+        </p:txBody>
+      </p:sp>
+      <p:pic>
+        <p:nvPicPr>
+          <p:cNvPr id="6" name="Picture 5" descr="סיבת רישום.png"/>
+          <p:cNvPicPr>
+            <a:picLocks noChangeAspect="1"/>
+          </p:cNvPicPr>
+          <p:nvPr/>
+        </p:nvPicPr>
+        <p:blipFill>
+          <a:blip r:embed="rId4"/>
+          <a:stretch>
+            <a:fillRect/>
+          </a:stretch>
+        </p:blipFill>
+        <p:spPr>
+          <a:xfrm>
+            <a:off x="182880" y="6400800"/>
+            <a:ext cx="4572000" cy="1857375"/>
           </a:xfrm>
           <a:prstGeom prst="rect">
             <a:avLst/>
@@ -3940,55 +3315,35 @@
               </a:defRPr>
             </a:pPr>
             <a:r>
-              <a:t>נתונים כלליים</a:t>
-            </a:r>
-          </a:p>
-        </p:txBody>
-      </p:sp>
-      <p:sp>
-        <p:nvSpPr>
-          <p:cNvPr id="4" name="TextBox 3"/>
-          <p:cNvSpPr txBox="1"/>
+              <a:t>התפלגות מגדרית</a:t>
+            </a:r>
+          </a:p>
+        </p:txBody>
+      </p:sp>
+      <p:pic>
+        <p:nvPicPr>
+          <p:cNvPr id="4" name="Picture 3" descr="גרף_מגדר.png"/>
+          <p:cNvPicPr>
+            <a:picLocks noChangeAspect="1"/>
+          </p:cNvPicPr>
           <p:nvPr/>
-        </p:nvSpPr>
-        <p:spPr>
-          <a:xfrm>
-            <a:off x="3566160" y="1828800"/>
-            <a:ext cx="10972800" cy="3657600"/>
+        </p:nvPicPr>
+        <p:blipFill>
+          <a:blip r:embed="rId3"/>
+          <a:stretch>
+            <a:fillRect/>
+          </a:stretch>
+        </p:blipFill>
+        <p:spPr>
+          <a:xfrm>
+            <a:off x="2743200" y="1645920"/>
+            <a:ext cx="8837368" cy="5029200"/>
           </a:xfrm>
           <a:prstGeom prst="rect">
             <a:avLst/>
           </a:prstGeom>
-          <a:noFill/>
-        </p:spPr>
-        <p:txBody>
-          <a:bodyPr wrap="none">
-            <a:spAutoFit/>
-          </a:bodyPr>
-          <a:lstStyle/>
-          <a:p/>
-          <a:p>
-            <a:pPr algn="r">
-              <a:defRPr sz="3500" b="1"/>
-            </a:pPr>
-            <a:r>
-              <a:t>563,901סך הכל דורשי עבודה בכלל הארץ  </a:t>
-            </a:r>
-            <a:br/>
-            <a:br/>
-            <a:r>
-              <a:t>91,677סך הכל דורשי עבודה במחוז דרום  </a:t>
-            </a:r>
-            <a:br/>
-            <a:br/>
-            <a:r>
-              <a:t>2,883סך הכל דורשי עבודה בלשכת אופקים  </a:t>
-            </a:r>
-            <a:br/>
-            <a:br/>
-          </a:p>
-        </p:txBody>
-      </p:sp>
+        </p:spPr>
+      </p:pic>
     </p:spTree>
   </p:cSld>
   <p:clrMapOvr>
@@ -4063,14 +3418,14 @@
               </a:defRPr>
             </a:pPr>
             <a:r>
-              <a:t>התפלגות סוג תביעה</a:t>
+              <a:t>התפלגות הגילאים של דורשי עבודה</a:t>
             </a:r>
           </a:p>
         </p:txBody>
       </p:sp>
       <p:pic>
         <p:nvPicPr>
-          <p:cNvPr id="4" name="Picture 3" descr="גרף_סוג_תביעה_כלל הארץ.png"/>
+          <p:cNvPr id="4" name="Picture 3" descr="גרף_גילאים.png"/>
           <p:cNvPicPr>
             <a:picLocks noChangeAspect="1"/>
           </p:cNvPicPr>
@@ -4084,56 +3439,8 @@
         </p:blipFill>
         <p:spPr>
           <a:xfrm>
-            <a:off x="0" y="1645920"/>
-            <a:ext cx="4876800" cy="4594219"/>
-          </a:xfrm>
-          <a:prstGeom prst="rect">
-            <a:avLst/>
-          </a:prstGeom>
-        </p:spPr>
-      </p:pic>
-      <p:pic>
-        <p:nvPicPr>
-          <p:cNvPr id="5" name="Picture 4" descr="גרף_סוג_תביעה_מחוז דרום.png"/>
-          <p:cNvPicPr>
-            <a:picLocks noChangeAspect="1"/>
-          </p:cNvPicPr>
-          <p:nvPr/>
-        </p:nvPicPr>
-        <p:blipFill>
-          <a:blip r:embed="rId4"/>
-          <a:stretch>
-            <a:fillRect/>
-          </a:stretch>
-        </p:blipFill>
-        <p:spPr>
-          <a:xfrm>
-            <a:off x="4876800" y="1645920"/>
-            <a:ext cx="4876800" cy="4611458"/>
-          </a:xfrm>
-          <a:prstGeom prst="rect">
-            <a:avLst/>
-          </a:prstGeom>
-        </p:spPr>
-      </p:pic>
-      <p:pic>
-        <p:nvPicPr>
-          <p:cNvPr id="6" name="Picture 5" descr="גרף_סוג_תביעה_לשכת אופקים.png"/>
-          <p:cNvPicPr>
-            <a:picLocks noChangeAspect="1"/>
-          </p:cNvPicPr>
-          <p:nvPr/>
-        </p:nvPicPr>
-        <p:blipFill>
-          <a:blip r:embed="rId5"/>
-          <a:stretch>
-            <a:fillRect/>
-          </a:stretch>
-        </p:blipFill>
-        <p:spPr>
-          <a:xfrm>
-            <a:off x="9753600" y="1645920"/>
-            <a:ext cx="4876800" cy="4611458"/>
+            <a:off x="3200400" y="1463040"/>
+            <a:ext cx="7315200" cy="4528049"/>
           </a:xfrm>
           <a:prstGeom prst="rect">
             <a:avLst/>
@@ -4214,14 +3521,14 @@
               </a:defRPr>
             </a:pPr>
             <a:r>
-              <a:t>התפלגות סיבת הרישום של דורשי עבודה לשירות</a:t>
+              <a:t>התפלגות רמות ההשכלה של דורשי עבודה</a:t>
             </a:r>
           </a:p>
         </p:txBody>
       </p:sp>
       <p:pic>
         <p:nvPicPr>
-          <p:cNvPr id="4" name="Picture 3" descr="גרף_סיבת_רישום.png"/>
+          <p:cNvPr id="4" name="Picture 3" descr="גרף_השכלה_כלל הארץ.png"/>
           <p:cNvPicPr>
             <a:picLocks noChangeAspect="1"/>
           </p:cNvPicPr>
@@ -4235,8 +3542,56 @@
         </p:blipFill>
         <p:spPr>
           <a:xfrm>
-            <a:off x="2743200" y="1645920"/>
-            <a:ext cx="8631936" cy="3929987"/>
+            <a:off x="0" y="1645920"/>
+            <a:ext cx="4876800" cy="4198374"/>
+          </a:xfrm>
+          <a:prstGeom prst="rect">
+            <a:avLst/>
+          </a:prstGeom>
+        </p:spPr>
+      </p:pic>
+      <p:pic>
+        <p:nvPicPr>
+          <p:cNvPr id="5" name="Picture 4" descr="גרף_השכלה_מחוז דרום.png"/>
+          <p:cNvPicPr>
+            <a:picLocks noChangeAspect="1"/>
+          </p:cNvPicPr>
+          <p:nvPr/>
+        </p:nvPicPr>
+        <p:blipFill>
+          <a:blip r:embed="rId4"/>
+          <a:stretch>
+            <a:fillRect/>
+          </a:stretch>
+        </p:blipFill>
+        <p:spPr>
+          <a:xfrm>
+            <a:off x="4876800" y="1645920"/>
+            <a:ext cx="4876800" cy="4139948"/>
+          </a:xfrm>
+          <a:prstGeom prst="rect">
+            <a:avLst/>
+          </a:prstGeom>
+        </p:spPr>
+      </p:pic>
+      <p:pic>
+        <p:nvPicPr>
+          <p:cNvPr id="6" name="Picture 5" descr="גרף_השכלה_לשכת אופקים.png"/>
+          <p:cNvPicPr>
+            <a:picLocks noChangeAspect="1"/>
+          </p:cNvPicPr>
+          <p:nvPr/>
+        </p:nvPicPr>
+        <p:blipFill>
+          <a:blip r:embed="rId5"/>
+          <a:stretch>
+            <a:fillRect/>
+          </a:stretch>
+        </p:blipFill>
+        <p:spPr>
+          <a:xfrm>
+            <a:off x="9753600" y="1645920"/>
+            <a:ext cx="4876800" cy="4232507"/>
           </a:xfrm>
           <a:prstGeom prst="rect">
             <a:avLst/>
@@ -4317,14 +3672,14 @@
               </a:defRPr>
             </a:pPr>
             <a:r>
-              <a:t>התפלגות מגדרית</a:t>
+              <a:t>התפלגות מצב משפחתי</a:t>
             </a:r>
           </a:p>
         </p:txBody>
       </p:sp>
       <p:pic>
         <p:nvPicPr>
-          <p:cNvPr id="4" name="Picture 3" descr="גרף_מגדר.png"/>
+          <p:cNvPr id="4" name="Picture 3" descr="גרף_מצב_משפחתי.png"/>
           <p:cNvPicPr>
             <a:picLocks noChangeAspect="1"/>
           </p:cNvPicPr>
@@ -4339,7 +3694,7 @@
         <p:spPr>
           <a:xfrm>
             <a:off x="2743200" y="1645920"/>
-            <a:ext cx="8837368" cy="5029200"/>
+            <a:ext cx="9563536" cy="5029200"/>
           </a:xfrm>
           <a:prstGeom prst="rect">
             <a:avLst/>
@@ -4420,14 +3775,14 @@
               </a:defRPr>
             </a:pPr>
             <a:r>
-              <a:t>התפלגות הגילאים של דורשי עבודה</a:t>
+              <a:t>18התפלגות כמות ילדים מתחת לגיל </a:t>
             </a:r>
           </a:p>
         </p:txBody>
       </p:sp>
       <p:pic>
         <p:nvPicPr>
-          <p:cNvPr id="4" name="Picture 3" descr="גרף_גילאים.png"/>
+          <p:cNvPr id="4" name="Picture 3" descr="גרף_כמות_ילדים.png"/>
           <p:cNvPicPr>
             <a:picLocks noChangeAspect="1"/>
           </p:cNvPicPr>
@@ -4441,8 +3796,8 @@
         </p:blipFill>
         <p:spPr>
           <a:xfrm>
-            <a:off x="3200400" y="1463040"/>
-            <a:ext cx="7315200" cy="4528049"/>
+            <a:off x="2743200" y="1371600"/>
+            <a:ext cx="10789920" cy="5207567"/>
           </a:xfrm>
           <a:prstGeom prst="rect">
             <a:avLst/>
@@ -4523,14 +3878,14 @@
               </a:defRPr>
             </a:pPr>
             <a:r>
-              <a:t>התפלגות רמות ההשכלה של דורשי עבודה</a:t>
+              <a:t>מקצועות שכיחים בלשכת אופקים</a:t>
             </a:r>
           </a:p>
         </p:txBody>
       </p:sp>
       <p:pic>
         <p:nvPicPr>
-          <p:cNvPr id="4" name="Picture 3" descr="גרף_השכלה_כלל הארץ.png"/>
+          <p:cNvPr id="4" name="Picture 3" descr="מקצועות שכיחים.png"/>
           <p:cNvPicPr>
             <a:picLocks noChangeAspect="1"/>
           </p:cNvPicPr>
@@ -4544,56 +3899,8 @@
         </p:blipFill>
         <p:spPr>
           <a:xfrm>
-            <a:off x="0" y="1645920"/>
-            <a:ext cx="4876800" cy="4198374"/>
-          </a:xfrm>
-          <a:prstGeom prst="rect">
-            <a:avLst/>
-          </a:prstGeom>
-        </p:spPr>
-      </p:pic>
-      <p:pic>
-        <p:nvPicPr>
-          <p:cNvPr id="5" name="Picture 4" descr="גרף_השכלה_מחוז דרום.png"/>
-          <p:cNvPicPr>
-            <a:picLocks noChangeAspect="1"/>
-          </p:cNvPicPr>
-          <p:nvPr/>
-        </p:nvPicPr>
-        <p:blipFill>
-          <a:blip r:embed="rId4"/>
-          <a:stretch>
-            <a:fillRect/>
-          </a:stretch>
-        </p:blipFill>
-        <p:spPr>
-          <a:xfrm>
-            <a:off x="4876800" y="1645920"/>
-            <a:ext cx="4876800" cy="4139948"/>
-          </a:xfrm>
-          <a:prstGeom prst="rect">
-            <a:avLst/>
-          </a:prstGeom>
-        </p:spPr>
-      </p:pic>
-      <p:pic>
-        <p:nvPicPr>
-          <p:cNvPr id="6" name="Picture 5" descr="גרף_השכלה_לשכת אופקים.png"/>
-          <p:cNvPicPr>
-            <a:picLocks noChangeAspect="1"/>
-          </p:cNvPicPr>
-          <p:nvPr/>
-        </p:nvPicPr>
-        <p:blipFill>
-          <a:blip r:embed="rId5"/>
-          <a:stretch>
-            <a:fillRect/>
-          </a:stretch>
-        </p:blipFill>
-        <p:spPr>
-          <a:xfrm>
-            <a:off x="9753600" y="1645920"/>
-            <a:ext cx="4876800" cy="4232507"/>
+            <a:off x="2743200" y="1371600"/>
+            <a:ext cx="6702552" cy="5020056"/>
           </a:xfrm>
           <a:prstGeom prst="rect">
             <a:avLst/>
@@ -4674,14 +3981,14 @@
               </a:defRPr>
             </a:pPr>
             <a:r>
-              <a:t>התפלגות מצב משפחתי</a:t>
+              <a:t>התפלגות משלחי היד - מבט כללי</a:t>
             </a:r>
           </a:p>
         </p:txBody>
       </p:sp>
       <p:pic>
         <p:nvPicPr>
-          <p:cNvPr id="4" name="Picture 3" descr="גרף_מצב_משפחתי.png"/>
+          <p:cNvPr id="4" name="Picture 3" descr="גרף_מקצועות.png"/>
           <p:cNvPicPr>
             <a:picLocks noChangeAspect="1"/>
           </p:cNvPicPr>
@@ -4695,111 +4002,8 @@
         </p:blipFill>
         <p:spPr>
           <a:xfrm>
-            <a:off x="2743200" y="1645920"/>
-            <a:ext cx="9563536" cy="5029200"/>
-          </a:xfrm>
-          <a:prstGeom prst="rect">
-            <a:avLst/>
-          </a:prstGeom>
-        </p:spPr>
-      </p:pic>
-    </p:spTree>
-  </p:cSld>
-  <p:clrMapOvr>
-    <a:masterClrMapping/>
-  </p:clrMapOvr>
-</p:sld>
-</file>
-
-<file path=ppt/slides/slide9.xml><?xml version="1.0" encoding="utf-8"?>
-<p:sld xmlns:a="http://schemas.openxmlformats.org/drawingml/2006/main" xmlns:p="http://schemas.openxmlformats.org/presentationml/2006/main" xmlns:r="http://schemas.openxmlformats.org/officeDocument/2006/relationships">
-  <p:cSld>
-    <p:spTree>
-      <p:nvGrpSpPr>
-        <p:cNvPr id="1" name=""/>
-        <p:cNvGrpSpPr/>
-        <p:nvPr/>
-      </p:nvGrpSpPr>
-      <p:grpSpPr/>
-      <p:pic>
-        <p:nvPicPr>
-          <p:cNvPr id="2" name="Picture 1" descr="bck_all_slide.png"/>
-          <p:cNvPicPr>
-            <a:picLocks noChangeAspect="1"/>
-          </p:cNvPicPr>
-          <p:nvPr/>
-        </p:nvPicPr>
-        <p:blipFill>
-          <a:blip r:embed="rId2"/>
-          <a:stretch>
-            <a:fillRect/>
-          </a:stretch>
-        </p:blipFill>
-        <p:spPr>
-          <a:xfrm>
-            <a:off x="0" y="0"/>
-            <a:ext cx="14630400" cy="8229600"/>
-          </a:xfrm>
-          <a:prstGeom prst="rect">
-            <a:avLst/>
-          </a:prstGeom>
-        </p:spPr>
-      </p:pic>
-      <p:sp>
-        <p:nvSpPr>
-          <p:cNvPr id="3" name="TextBox 2"/>
-          <p:cNvSpPr txBox="1"/>
-          <p:nvPr/>
-        </p:nvSpPr>
-        <p:spPr>
-          <a:xfrm>
-            <a:off x="6858000" y="91440"/>
-            <a:ext cx="7315200" cy="914400"/>
-          </a:xfrm>
-          <a:prstGeom prst="rect">
-            <a:avLst/>
-          </a:prstGeom>
-          <a:noFill/>
-        </p:spPr>
-        <p:txBody>
-          <a:bodyPr wrap="none">
-            <a:spAutoFit/>
-          </a:bodyPr>
-          <a:lstStyle/>
-          <a:p/>
-          <a:p>
-            <a:pPr algn="r">
-              <a:defRPr sz="3800" b="1">
-                <a:solidFill>
-                  <a:srgbClr val="FFFFFF"/>
-                </a:solidFill>
-                <a:latin typeface="Ariel"/>
-              </a:defRPr>
-            </a:pPr>
-            <a:r>
-              <a:t>18התפלגות כמות ילדים מתחת לגיל </a:t>
-            </a:r>
-          </a:p>
-        </p:txBody>
-      </p:sp>
-      <p:pic>
-        <p:nvPicPr>
-          <p:cNvPr id="4" name="Picture 3" descr="גרף_כמות_ילדים.png"/>
-          <p:cNvPicPr>
-            <a:picLocks noChangeAspect="1"/>
-          </p:cNvPicPr>
-          <p:nvPr/>
-        </p:nvPicPr>
-        <p:blipFill>
-          <a:blip r:embed="rId3"/>
-          <a:stretch>
-            <a:fillRect/>
-          </a:stretch>
-        </p:blipFill>
-        <p:spPr>
-          <a:xfrm>
-            <a:off x="2743200" y="1371600"/>
-            <a:ext cx="10789920" cy="5207567"/>
+            <a:off x="1828800" y="1371600"/>
+            <a:ext cx="12527280" cy="7973713"/>
           </a:xfrm>
           <a:prstGeom prst="rect">
             <a:avLst/>

</xml_diff>

<commit_message>
pptx - slide family
</commit_message>
<xml_diff>
--- a/pkls_n_debugging/testing/השוואת כלל הארץ, מחוז דרום, לשכת אופקים.pptx
+++ b/pkls_n_debugging/testing/השוואת כלל הארץ, מחוז דרום, לשכת אופקים.pptx
@@ -13,6 +13,9 @@
     <p:sldId id="261" r:id="rId12"/>
     <p:sldId id="262" r:id="rId13"/>
     <p:sldId id="263" r:id="rId14"/>
+    <p:sldId id="264" r:id="rId15"/>
+    <p:sldId id="265" r:id="rId16"/>
+    <p:sldId id="266" r:id="rId17"/>
   </p:sldIdLst>
   <p:sldSz cx="14630400" cy="8229600" type="screen4x3"/>
   <p:notesSz cx="6858000" cy="9144000"/>
@@ -3097,6 +3100,165 @@
       <p:grpSpPr/>
       <p:pic>
         <p:nvPicPr>
+          <p:cNvPr id="2" name="Picture 1" descr="bck_first_slide.png"/>
+          <p:cNvPicPr>
+            <a:picLocks noChangeAspect="1"/>
+          </p:cNvPicPr>
+          <p:nvPr/>
+        </p:nvPicPr>
+        <p:blipFill>
+          <a:blip r:embed="rId2"/>
+          <a:stretch>
+            <a:fillRect/>
+          </a:stretch>
+        </p:blipFill>
+        <p:spPr>
+          <a:xfrm>
+            <a:off x="0" y="0"/>
+            <a:ext cx="14630400" cy="8229600"/>
+          </a:xfrm>
+          <a:prstGeom prst="rect">
+            <a:avLst/>
+          </a:prstGeom>
+        </p:spPr>
+      </p:pic>
+      <p:sp>
+        <p:nvSpPr>
+          <p:cNvPr id="3" name="TextBox 2"/>
+          <p:cNvSpPr txBox="1"/>
+          <p:nvPr/>
+        </p:nvSpPr>
+        <p:spPr>
+          <a:xfrm>
+            <a:off x="10515600" y="1828800"/>
+            <a:ext cx="3657600" cy="1828800"/>
+          </a:xfrm>
+          <a:prstGeom prst="rect">
+            <a:avLst/>
+          </a:prstGeom>
+          <a:noFill/>
+        </p:spPr>
+        <p:txBody>
+          <a:bodyPr wrap="none">
+            <a:spAutoFit/>
+          </a:bodyPr>
+          <a:lstStyle/>
+          <a:p/>
+          <a:p>
+            <a:pPr algn="r">
+              <a:defRPr sz="6400" b="1">
+                <a:solidFill>
+                  <a:srgbClr val="FFFFFF"/>
+                </a:solidFill>
+                <a:latin typeface="Ariel"/>
+              </a:defRPr>
+            </a:pPr>
+            <a:r>
+              <a:t>נתוני שירות התעסוקה</a:t>
+            </a:r>
+          </a:p>
+        </p:txBody>
+      </p:sp>
+      <p:sp>
+        <p:nvSpPr>
+          <p:cNvPr id="4" name="TextBox 3"/>
+          <p:cNvSpPr txBox="1"/>
+          <p:nvPr/>
+        </p:nvSpPr>
+        <p:spPr>
+          <a:xfrm>
+            <a:off x="10515600" y="3657600"/>
+            <a:ext cx="3657600" cy="1828800"/>
+          </a:xfrm>
+          <a:prstGeom prst="rect">
+            <a:avLst/>
+          </a:prstGeom>
+          <a:noFill/>
+        </p:spPr>
+        <p:txBody>
+          <a:bodyPr wrap="none">
+            <a:spAutoFit/>
+          </a:bodyPr>
+          <a:lstStyle/>
+          <a:p/>
+          <a:p>
+            <a:pPr algn="r">
+              <a:defRPr sz="4000" b="1">
+                <a:solidFill>
+                  <a:srgbClr val="FFFFFF"/>
+                </a:solidFill>
+                <a:latin typeface="Ariel"/>
+              </a:defRPr>
+            </a:pPr>
+            <a:r>
+              <a:t>כלל הארץ</a:t>
+            </a:r>
+            <a:br/>
+            <a:r>
+              <a:t>מחוז דרום</a:t>
+            </a:r>
+            <a:br/>
+            <a:r>
+              <a:t>לשכת אופקים</a:t>
+            </a:r>
+            <a:br/>
+          </a:p>
+        </p:txBody>
+      </p:sp>
+      <p:sp>
+        <p:nvSpPr>
+          <p:cNvPr id="5" name="TextBox 4"/>
+          <p:cNvSpPr txBox="1"/>
+          <p:nvPr/>
+        </p:nvSpPr>
+        <p:spPr>
+          <a:xfrm>
+            <a:off x="10789920" y="7269480"/>
+            <a:ext cx="3657600" cy="1828800"/>
+          </a:xfrm>
+          <a:prstGeom prst="rect">
+            <a:avLst/>
+          </a:prstGeom>
+          <a:noFill/>
+        </p:spPr>
+        <p:txBody>
+          <a:bodyPr wrap="none">
+            <a:spAutoFit/>
+          </a:bodyPr>
+          <a:lstStyle/>
+          <a:p/>
+          <a:p>
+            <a:pPr algn="r">
+              <a:defRPr sz="3500" b="1">
+                <a:latin typeface="Ariel"/>
+              </a:defRPr>
+            </a:pPr>
+            <a:r>
+              <a:t>13/09/2021</a:t>
+            </a:r>
+          </a:p>
+        </p:txBody>
+      </p:sp>
+    </p:spTree>
+  </p:cSld>
+  <p:clrMapOvr>
+    <a:masterClrMapping/>
+  </p:clrMapOvr>
+</p:sld>
+</file>
+
+<file path=ppt/slides/slide10.xml><?xml version="1.0" encoding="utf-8"?>
+<p:sld xmlns:a="http://schemas.openxmlformats.org/drawingml/2006/main" xmlns:p="http://schemas.openxmlformats.org/presentationml/2006/main" xmlns:r="http://schemas.openxmlformats.org/officeDocument/2006/relationships">
+  <p:cSld>
+    <p:spTree>
+      <p:nvGrpSpPr>
+        <p:cNvPr id="1" name=""/>
+        <p:cNvGrpSpPr/>
+        <p:nvPr/>
+      </p:nvGrpSpPr>
+      <p:grpSpPr/>
+      <p:pic>
+        <p:nvPicPr>
           <p:cNvPr id="2" name="Picture 1" descr="bck_all_slide.png"/>
           <p:cNvPicPr>
             <a:picLocks noChangeAspect="1"/>
@@ -3151,14 +3313,14 @@
               </a:defRPr>
             </a:pPr>
             <a:r>
-              <a:t>התפלגות סיבת הרישום של דורשי עבודה לשירות</a:t>
+              <a:t>מקצועות שכיחים בלשכת אופקים</a:t>
             </a:r>
           </a:p>
         </p:txBody>
       </p:sp>
       <p:pic>
         <p:nvPicPr>
-          <p:cNvPr id="4" name="Picture 3" descr="גרף_סיבת_רישום.png"/>
+          <p:cNvPr id="4" name="Picture 3" descr="מקצועות שכיחים.png"/>
           <p:cNvPicPr>
             <a:picLocks noChangeAspect="1"/>
           </p:cNvPicPr>
@@ -3172,69 +3334,111 @@
         </p:blipFill>
         <p:spPr>
           <a:xfrm>
-            <a:off x="2743200" y="1280160"/>
-            <a:ext cx="10058400" cy="4579434"/>
+            <a:off x="2743200" y="1371600"/>
+            <a:ext cx="6702552" cy="5020056"/>
           </a:xfrm>
           <a:prstGeom prst="rect">
             <a:avLst/>
           </a:prstGeom>
         </p:spPr>
       </p:pic>
-      <p:sp>
-        <p:nvSpPr>
-          <p:cNvPr id="5" name="TextBox 4"/>
-          <p:cNvSpPr txBox="1"/>
-          <p:nvPr/>
-        </p:nvSpPr>
-        <p:spPr>
-          <a:xfrm>
-            <a:off x="5486400" y="6858000"/>
-            <a:ext cx="9144000" cy="1371600"/>
-          </a:xfrm>
-          <a:prstGeom prst="rect">
-            <a:avLst/>
-          </a:prstGeom>
-          <a:noFill/>
-        </p:spPr>
-        <p:txBody>
-          <a:bodyPr wrap="none">
-            <a:spAutoFit/>
-          </a:bodyPr>
-          <a:lstStyle/>
-          <a:p/>
-          <a:p>
-            <a:pPr algn="r">
-              <a:defRPr sz="2500">
-                <a:solidFill>
-                  <a:srgbClr val="A9A9A9"/>
-                </a:solidFill>
-                <a:latin typeface="Ariel"/>
-              </a:defRPr>
-            </a:pPr>
-            <a:r>
-              <a:t>ניתן להכניס טקסט כאן</a:t>
-            </a:r>
-          </a:p>
-        </p:txBody>
-      </p:sp>
+    </p:spTree>
+  </p:cSld>
+  <p:clrMapOvr>
+    <a:masterClrMapping/>
+  </p:clrMapOvr>
+</p:sld>
+</file>
+
+<file path=ppt/slides/slide11.xml><?xml version="1.0" encoding="utf-8"?>
+<p:sld xmlns:a="http://schemas.openxmlformats.org/drawingml/2006/main" xmlns:p="http://schemas.openxmlformats.org/presentationml/2006/main" xmlns:r="http://schemas.openxmlformats.org/officeDocument/2006/relationships">
+  <p:cSld>
+    <p:spTree>
+      <p:nvGrpSpPr>
+        <p:cNvPr id="1" name=""/>
+        <p:cNvGrpSpPr/>
+        <p:nvPr/>
+      </p:nvGrpSpPr>
+      <p:grpSpPr/>
       <p:pic>
         <p:nvPicPr>
-          <p:cNvPr id="6" name="Picture 5" descr="סיבת רישום.png"/>
+          <p:cNvPr id="2" name="Picture 1" descr="bck_all_slide.png"/>
           <p:cNvPicPr>
             <a:picLocks noChangeAspect="1"/>
           </p:cNvPicPr>
           <p:nvPr/>
         </p:nvPicPr>
         <p:blipFill>
-          <a:blip r:embed="rId4"/>
+          <a:blip r:embed="rId2"/>
           <a:stretch>
             <a:fillRect/>
           </a:stretch>
         </p:blipFill>
         <p:spPr>
           <a:xfrm>
-            <a:off x="182880" y="6400800"/>
-            <a:ext cx="4572000" cy="1857375"/>
+            <a:off x="0" y="0"/>
+            <a:ext cx="14630400" cy="8229600"/>
+          </a:xfrm>
+          <a:prstGeom prst="rect">
+            <a:avLst/>
+          </a:prstGeom>
+        </p:spPr>
+      </p:pic>
+      <p:sp>
+        <p:nvSpPr>
+          <p:cNvPr id="3" name="TextBox 2"/>
+          <p:cNvSpPr txBox="1"/>
+          <p:nvPr/>
+        </p:nvSpPr>
+        <p:spPr>
+          <a:xfrm>
+            <a:off x="6858000" y="91440"/>
+            <a:ext cx="7315200" cy="914400"/>
+          </a:xfrm>
+          <a:prstGeom prst="rect">
+            <a:avLst/>
+          </a:prstGeom>
+          <a:noFill/>
+        </p:spPr>
+        <p:txBody>
+          <a:bodyPr wrap="none">
+            <a:spAutoFit/>
+          </a:bodyPr>
+          <a:lstStyle/>
+          <a:p/>
+          <a:p>
+            <a:pPr algn="r">
+              <a:defRPr sz="3800" b="1">
+                <a:solidFill>
+                  <a:srgbClr val="FFFFFF"/>
+                </a:solidFill>
+                <a:latin typeface="Ariel"/>
+              </a:defRPr>
+            </a:pPr>
+            <a:r>
+              <a:t>התפלגות משלחי היד - מבט כללי</a:t>
+            </a:r>
+          </a:p>
+        </p:txBody>
+      </p:sp>
+      <p:pic>
+        <p:nvPicPr>
+          <p:cNvPr id="4" name="Picture 3" descr="גרף_מקצועות.png"/>
+          <p:cNvPicPr>
+            <a:picLocks noChangeAspect="1"/>
+          </p:cNvPicPr>
+          <p:nvPr/>
+        </p:nvPicPr>
+        <p:blipFill>
+          <a:blip r:embed="rId3"/>
+          <a:stretch>
+            <a:fillRect/>
+          </a:stretch>
+        </p:blipFill>
+        <p:spPr>
+          <a:xfrm>
+            <a:off x="1828800" y="1371600"/>
+            <a:ext cx="12527280" cy="7973713"/>
           </a:xfrm>
           <a:prstGeom prst="rect">
             <a:avLst/>
@@ -3315,35 +3519,55 @@
               </a:defRPr>
             </a:pPr>
             <a:r>
-              <a:t>התפלגות מגדרית</a:t>
-            </a:r>
-          </a:p>
-        </p:txBody>
-      </p:sp>
-      <p:pic>
-        <p:nvPicPr>
-          <p:cNvPr id="4" name="Picture 3" descr="גרף_מגדר.png"/>
-          <p:cNvPicPr>
-            <a:picLocks noChangeAspect="1"/>
-          </p:cNvPicPr>
+              <a:t>נתונים כלליים</a:t>
+            </a:r>
+          </a:p>
+        </p:txBody>
+      </p:sp>
+      <p:sp>
+        <p:nvSpPr>
+          <p:cNvPr id="4" name="TextBox 3"/>
+          <p:cNvSpPr txBox="1"/>
           <p:nvPr/>
-        </p:nvPicPr>
-        <p:blipFill>
-          <a:blip r:embed="rId3"/>
-          <a:stretch>
-            <a:fillRect/>
-          </a:stretch>
-        </p:blipFill>
-        <p:spPr>
-          <a:xfrm>
-            <a:off x="2743200" y="1645920"/>
-            <a:ext cx="8837368" cy="5029200"/>
-          </a:xfrm>
-          <a:prstGeom prst="rect">
-            <a:avLst/>
-          </a:prstGeom>
-        </p:spPr>
-      </p:pic>
+        </p:nvSpPr>
+        <p:spPr>
+          <a:xfrm>
+            <a:off x="3566160" y="1828800"/>
+            <a:ext cx="10972800" cy="3657600"/>
+          </a:xfrm>
+          <a:prstGeom prst="rect">
+            <a:avLst/>
+          </a:prstGeom>
+          <a:noFill/>
+        </p:spPr>
+        <p:txBody>
+          <a:bodyPr wrap="none">
+            <a:spAutoFit/>
+          </a:bodyPr>
+          <a:lstStyle/>
+          <a:p/>
+          <a:p>
+            <a:pPr algn="r">
+              <a:defRPr sz="3500" b="1"/>
+            </a:pPr>
+            <a:r>
+              <a:t>563,901סך הכל דורשי עבודה בכלל הארץ  </a:t>
+            </a:r>
+            <a:br/>
+            <a:br/>
+            <a:r>
+              <a:t>91,677סך הכל דורשי עבודה במחוז דרום  </a:t>
+            </a:r>
+            <a:br/>
+            <a:br/>
+            <a:r>
+              <a:t>2,883סך הכל דורשי עבודה בלשכת אופקים  </a:t>
+            </a:r>
+            <a:br/>
+            <a:br/>
+          </a:p>
+        </p:txBody>
+      </p:sp>
     </p:spTree>
   </p:cSld>
   <p:clrMapOvr>
@@ -3418,14 +3642,14 @@
               </a:defRPr>
             </a:pPr>
             <a:r>
-              <a:t>התפלגות הגילאים של דורשי עבודה</a:t>
+              <a:t>התפלגות סוג תביעה</a:t>
             </a:r>
           </a:p>
         </p:txBody>
       </p:sp>
       <p:pic>
         <p:nvPicPr>
-          <p:cNvPr id="4" name="Picture 3" descr="גרף_גילאים.png"/>
+          <p:cNvPr id="4" name="Picture 3" descr="גרף_סוג_תביעה_כלל הארץ.png"/>
           <p:cNvPicPr>
             <a:picLocks noChangeAspect="1"/>
           </p:cNvPicPr>
@@ -3439,8 +3663,117 @@
         </p:blipFill>
         <p:spPr>
           <a:xfrm>
-            <a:off x="3200400" y="1463040"/>
-            <a:ext cx="7315200" cy="4528049"/>
+            <a:off x="0" y="1371600"/>
+            <a:ext cx="4876800" cy="4594219"/>
+          </a:xfrm>
+          <a:prstGeom prst="rect">
+            <a:avLst/>
+          </a:prstGeom>
+        </p:spPr>
+      </p:pic>
+      <p:pic>
+        <p:nvPicPr>
+          <p:cNvPr id="5" name="Picture 4" descr="גרף_סוג_תביעה_מחוז דרום.png"/>
+          <p:cNvPicPr>
+            <a:picLocks noChangeAspect="1"/>
+          </p:cNvPicPr>
+          <p:nvPr/>
+        </p:nvPicPr>
+        <p:blipFill>
+          <a:blip r:embed="rId4"/>
+          <a:stretch>
+            <a:fillRect/>
+          </a:stretch>
+        </p:blipFill>
+        <p:spPr>
+          <a:xfrm>
+            <a:off x="4876800" y="1371600"/>
+            <a:ext cx="4876800" cy="4611458"/>
+          </a:xfrm>
+          <a:prstGeom prst="rect">
+            <a:avLst/>
+          </a:prstGeom>
+        </p:spPr>
+      </p:pic>
+      <p:pic>
+        <p:nvPicPr>
+          <p:cNvPr id="6" name="Picture 5" descr="גרף_סוג_תביעה_לשכת אופקים.png"/>
+          <p:cNvPicPr>
+            <a:picLocks noChangeAspect="1"/>
+          </p:cNvPicPr>
+          <p:nvPr/>
+        </p:nvPicPr>
+        <p:blipFill>
+          <a:blip r:embed="rId5"/>
+          <a:stretch>
+            <a:fillRect/>
+          </a:stretch>
+        </p:blipFill>
+        <p:spPr>
+          <a:xfrm>
+            <a:off x="9753600" y="1371600"/>
+            <a:ext cx="4876800" cy="4611458"/>
+          </a:xfrm>
+          <a:prstGeom prst="rect">
+            <a:avLst/>
+          </a:prstGeom>
+        </p:spPr>
+      </p:pic>
+      <p:sp>
+        <p:nvSpPr>
+          <p:cNvPr id="7" name="TextBox 6"/>
+          <p:cNvSpPr txBox="1"/>
+          <p:nvPr/>
+        </p:nvSpPr>
+        <p:spPr>
+          <a:xfrm>
+            <a:off x="5394960" y="6858000"/>
+            <a:ext cx="9144000" cy="1371600"/>
+          </a:xfrm>
+          <a:prstGeom prst="rect">
+            <a:avLst/>
+          </a:prstGeom>
+          <a:noFill/>
+        </p:spPr>
+        <p:txBody>
+          <a:bodyPr wrap="none">
+            <a:spAutoFit/>
+          </a:bodyPr>
+          <a:lstStyle/>
+          <a:p/>
+          <a:p>
+            <a:pPr algn="r">
+              <a:defRPr sz="2500">
+                <a:solidFill>
+                  <a:srgbClr val="A9A9A9"/>
+                </a:solidFill>
+                <a:latin typeface="Ariel"/>
+              </a:defRPr>
+            </a:pPr>
+            <a:r>
+              <a:t>ניתן להכניס טקסט כאן</a:t>
+            </a:r>
+          </a:p>
+        </p:txBody>
+      </p:sp>
+      <p:pic>
+        <p:nvPicPr>
+          <p:cNvPr id="8" name="Picture 7" descr="סוג תביעה.png"/>
+          <p:cNvPicPr>
+            <a:picLocks noChangeAspect="1"/>
+          </p:cNvPicPr>
+          <p:nvPr/>
+        </p:nvPicPr>
+        <p:blipFill>
+          <a:blip r:embed="rId6"/>
+          <a:stretch>
+            <a:fillRect/>
+          </a:stretch>
+        </p:blipFill>
+        <p:spPr>
+          <a:xfrm>
+            <a:off x="182880" y="6400800"/>
+            <a:ext cx="4572000" cy="1676927"/>
           </a:xfrm>
           <a:prstGeom prst="rect">
             <a:avLst/>
@@ -3521,14 +3854,14 @@
               </a:defRPr>
             </a:pPr>
             <a:r>
-              <a:t>התפלגות רמות ההשכלה של דורשי עבודה</a:t>
+              <a:t>התפלגות סיבת הרישום של דורשי עבודה לשירות</a:t>
             </a:r>
           </a:p>
         </p:txBody>
       </p:sp>
       <p:pic>
         <p:nvPicPr>
-          <p:cNvPr id="4" name="Picture 3" descr="גרף_השכלה_כלל הארץ.png"/>
+          <p:cNvPr id="4" name="Picture 3" descr="גרף_סיבת_רישום.png"/>
           <p:cNvPicPr>
             <a:picLocks noChangeAspect="1"/>
           </p:cNvPicPr>
@@ -3542,17 +3875,54 @@
         </p:blipFill>
         <p:spPr>
           <a:xfrm>
-            <a:off x="0" y="1645920"/>
-            <a:ext cx="4876800" cy="4198374"/>
+            <a:off x="1828800" y="1097280"/>
+            <a:ext cx="10972800" cy="4995746"/>
           </a:xfrm>
           <a:prstGeom prst="rect">
             <a:avLst/>
           </a:prstGeom>
         </p:spPr>
       </p:pic>
+      <p:sp>
+        <p:nvSpPr>
+          <p:cNvPr id="5" name="TextBox 4"/>
+          <p:cNvSpPr txBox="1"/>
+          <p:nvPr/>
+        </p:nvSpPr>
+        <p:spPr>
+          <a:xfrm>
+            <a:off x="5394960" y="6858000"/>
+            <a:ext cx="9144000" cy="1371600"/>
+          </a:xfrm>
+          <a:prstGeom prst="rect">
+            <a:avLst/>
+          </a:prstGeom>
+          <a:noFill/>
+        </p:spPr>
+        <p:txBody>
+          <a:bodyPr wrap="none">
+            <a:spAutoFit/>
+          </a:bodyPr>
+          <a:lstStyle/>
+          <a:p/>
+          <a:p>
+            <a:pPr algn="r">
+              <a:defRPr sz="2500">
+                <a:solidFill>
+                  <a:srgbClr val="A9A9A9"/>
+                </a:solidFill>
+                <a:latin typeface="Ariel"/>
+              </a:defRPr>
+            </a:pPr>
+            <a:r>
+              <a:t>ניתן להכניס טקסט כאן</a:t>
+            </a:r>
+          </a:p>
+        </p:txBody>
+      </p:sp>
       <p:pic>
         <p:nvPicPr>
-          <p:cNvPr id="5" name="Picture 4" descr="גרף_השכלה_מחוז דרום.png"/>
+          <p:cNvPr id="6" name="Picture 5" descr="סיבת רישום.png"/>
           <p:cNvPicPr>
             <a:picLocks noChangeAspect="1"/>
           </p:cNvPicPr>
@@ -3566,32 +3936,8 @@
         </p:blipFill>
         <p:spPr>
           <a:xfrm>
-            <a:off x="4876800" y="1645920"/>
-            <a:ext cx="4876800" cy="4139948"/>
-          </a:xfrm>
-          <a:prstGeom prst="rect">
-            <a:avLst/>
-          </a:prstGeom>
-        </p:spPr>
-      </p:pic>
-      <p:pic>
-        <p:nvPicPr>
-          <p:cNvPr id="6" name="Picture 5" descr="גרף_השכלה_לשכת אופקים.png"/>
-          <p:cNvPicPr>
-            <a:picLocks noChangeAspect="1"/>
-          </p:cNvPicPr>
-          <p:nvPr/>
-        </p:nvPicPr>
-        <p:blipFill>
-          <a:blip r:embed="rId5"/>
-          <a:stretch>
-            <a:fillRect/>
-          </a:stretch>
-        </p:blipFill>
-        <p:spPr>
-          <a:xfrm>
-            <a:off x="9753600" y="1645920"/>
-            <a:ext cx="4876800" cy="4232507"/>
+            <a:off x="182880" y="6217920"/>
+            <a:ext cx="4572000" cy="1857375"/>
           </a:xfrm>
           <a:prstGeom prst="rect">
             <a:avLst/>
@@ -3672,14 +4018,14 @@
               </a:defRPr>
             </a:pPr>
             <a:r>
-              <a:t>התפלגות מצב משפחתי</a:t>
+              <a:t>התפלגות מגדרית</a:t>
             </a:r>
           </a:p>
         </p:txBody>
       </p:sp>
       <p:pic>
         <p:nvPicPr>
-          <p:cNvPr id="4" name="Picture 3" descr="גרף_מצב_משפחתי.png"/>
+          <p:cNvPr id="4" name="Picture 3" descr="גרף_מגדר.png"/>
           <p:cNvPicPr>
             <a:picLocks noChangeAspect="1"/>
           </p:cNvPicPr>
@@ -3693,8 +4039,69 @@
         </p:blipFill>
         <p:spPr>
           <a:xfrm>
-            <a:off x="2743200" y="1645920"/>
-            <a:ext cx="9563536" cy="5029200"/>
+            <a:off x="2743200" y="1371600"/>
+            <a:ext cx="8837368" cy="5029200"/>
+          </a:xfrm>
+          <a:prstGeom prst="rect">
+            <a:avLst/>
+          </a:prstGeom>
+        </p:spPr>
+      </p:pic>
+      <p:sp>
+        <p:nvSpPr>
+          <p:cNvPr id="5" name="TextBox 4"/>
+          <p:cNvSpPr txBox="1"/>
+          <p:nvPr/>
+        </p:nvSpPr>
+        <p:spPr>
+          <a:xfrm>
+            <a:off x="5394960" y="6858000"/>
+            <a:ext cx="9144000" cy="1371600"/>
+          </a:xfrm>
+          <a:prstGeom prst="rect">
+            <a:avLst/>
+          </a:prstGeom>
+          <a:noFill/>
+        </p:spPr>
+        <p:txBody>
+          <a:bodyPr wrap="none">
+            <a:spAutoFit/>
+          </a:bodyPr>
+          <a:lstStyle/>
+          <a:p/>
+          <a:p>
+            <a:pPr algn="r">
+              <a:defRPr sz="2500">
+                <a:solidFill>
+                  <a:srgbClr val="A9A9A9"/>
+                </a:solidFill>
+                <a:latin typeface="Ariel"/>
+              </a:defRPr>
+            </a:pPr>
+            <a:r>
+              <a:t>ניתן להכניס טקסט כאן</a:t>
+            </a:r>
+          </a:p>
+        </p:txBody>
+      </p:sp>
+      <p:pic>
+        <p:nvPicPr>
+          <p:cNvPr id="6" name="Picture 5" descr="מגדר.png"/>
+          <p:cNvPicPr>
+            <a:picLocks noChangeAspect="1"/>
+          </p:cNvPicPr>
+          <p:nvPr/>
+        </p:nvPicPr>
+        <p:blipFill>
+          <a:blip r:embed="rId4"/>
+          <a:stretch>
+            <a:fillRect/>
+          </a:stretch>
+        </p:blipFill>
+        <p:spPr>
+          <a:xfrm>
+            <a:off x="182880" y="6766560"/>
+            <a:ext cx="4572000" cy="1297246"/>
           </a:xfrm>
           <a:prstGeom prst="rect">
             <a:avLst/>
@@ -3775,14 +4182,14 @@
               </a:defRPr>
             </a:pPr>
             <a:r>
-              <a:t>18התפלגות כמות ילדים מתחת לגיל </a:t>
+              <a:t>התפלגות הגילאים של דורשי עבודה</a:t>
             </a:r>
           </a:p>
         </p:txBody>
       </p:sp>
       <p:pic>
         <p:nvPicPr>
-          <p:cNvPr id="4" name="Picture 3" descr="גרף_כמות_ילדים.png"/>
+          <p:cNvPr id="4" name="Picture 3" descr="גרף_גילאים.png"/>
           <p:cNvPicPr>
             <a:picLocks noChangeAspect="1"/>
           </p:cNvPicPr>
@@ -3796,8 +4203,69 @@
         </p:blipFill>
         <p:spPr>
           <a:xfrm>
-            <a:off x="2743200" y="1371600"/>
-            <a:ext cx="10789920" cy="5207567"/>
+            <a:off x="5212080" y="1463040"/>
+            <a:ext cx="9144000" cy="5660061"/>
+          </a:xfrm>
+          <a:prstGeom prst="rect">
+            <a:avLst/>
+          </a:prstGeom>
+        </p:spPr>
+      </p:pic>
+      <p:sp>
+        <p:nvSpPr>
+          <p:cNvPr id="5" name="TextBox 4"/>
+          <p:cNvSpPr txBox="1"/>
+          <p:nvPr/>
+        </p:nvSpPr>
+        <p:spPr>
+          <a:xfrm>
+            <a:off x="5394960" y="6858000"/>
+            <a:ext cx="9144000" cy="1371600"/>
+          </a:xfrm>
+          <a:prstGeom prst="rect">
+            <a:avLst/>
+          </a:prstGeom>
+          <a:noFill/>
+        </p:spPr>
+        <p:txBody>
+          <a:bodyPr wrap="none">
+            <a:spAutoFit/>
+          </a:bodyPr>
+          <a:lstStyle/>
+          <a:p/>
+          <a:p>
+            <a:pPr algn="r">
+              <a:defRPr sz="2500">
+                <a:solidFill>
+                  <a:srgbClr val="A9A9A9"/>
+                </a:solidFill>
+                <a:latin typeface="Ariel"/>
+              </a:defRPr>
+            </a:pPr>
+            <a:r>
+              <a:t>ניתן להכניס טקסט כאן</a:t>
+            </a:r>
+          </a:p>
+        </p:txBody>
+      </p:sp>
+      <p:pic>
+        <p:nvPicPr>
+          <p:cNvPr id="6" name="Picture 5" descr="גיל.png"/>
+          <p:cNvPicPr>
+            <a:picLocks noChangeAspect="1"/>
+          </p:cNvPicPr>
+          <p:nvPr/>
+        </p:nvPicPr>
+        <p:blipFill>
+          <a:blip r:embed="rId4"/>
+          <a:stretch>
+            <a:fillRect/>
+          </a:stretch>
+        </p:blipFill>
+        <p:spPr>
+          <a:xfrm>
+            <a:off x="182880" y="1554480"/>
+            <a:ext cx="4572000" cy="4342609"/>
           </a:xfrm>
           <a:prstGeom prst="rect">
             <a:avLst/>
@@ -3878,14 +4346,14 @@
               </a:defRPr>
             </a:pPr>
             <a:r>
-              <a:t>מקצועות שכיחים בלשכת אופקים</a:t>
+              <a:t>התפלגות רמות ההשכלה של דורשי עבודה</a:t>
             </a:r>
           </a:p>
         </p:txBody>
       </p:sp>
       <p:pic>
         <p:nvPicPr>
-          <p:cNvPr id="4" name="Picture 3" descr="מקצועות שכיחים.png"/>
+          <p:cNvPr id="4" name="Picture 3" descr="גרף_השכלה_כלל הארץ.png"/>
           <p:cNvPicPr>
             <a:picLocks noChangeAspect="1"/>
           </p:cNvPicPr>
@@ -3899,8 +4367,239 @@
         </p:blipFill>
         <p:spPr>
           <a:xfrm>
-            <a:off x="2743200" y="1371600"/>
-            <a:ext cx="6702552" cy="5020056"/>
+            <a:off x="0" y="1371600"/>
+            <a:ext cx="4876800" cy="4198374"/>
+          </a:xfrm>
+          <a:prstGeom prst="rect">
+            <a:avLst/>
+          </a:prstGeom>
+        </p:spPr>
+      </p:pic>
+      <p:sp>
+        <p:nvSpPr>
+          <p:cNvPr id="5" name="TextBox 4"/>
+          <p:cNvSpPr txBox="1"/>
+          <p:nvPr/>
+        </p:nvSpPr>
+        <p:spPr>
+          <a:xfrm>
+            <a:off x="5394960" y="6858000"/>
+            <a:ext cx="9144000" cy="1371600"/>
+          </a:xfrm>
+          <a:prstGeom prst="rect">
+            <a:avLst/>
+          </a:prstGeom>
+          <a:noFill/>
+        </p:spPr>
+        <p:txBody>
+          <a:bodyPr wrap="none">
+            <a:spAutoFit/>
+          </a:bodyPr>
+          <a:lstStyle/>
+          <a:p/>
+          <a:p>
+            <a:pPr algn="r">
+              <a:defRPr sz="2500">
+                <a:solidFill>
+                  <a:srgbClr val="A9A9A9"/>
+                </a:solidFill>
+                <a:latin typeface="Ariel"/>
+              </a:defRPr>
+            </a:pPr>
+            <a:r>
+              <a:t>ניתן להכניס טקסט כאן</a:t>
+            </a:r>
+          </a:p>
+        </p:txBody>
+      </p:sp>
+      <p:pic>
+        <p:nvPicPr>
+          <p:cNvPr id="6" name="Picture 5" descr="רמת השכלה.png"/>
+          <p:cNvPicPr>
+            <a:picLocks noChangeAspect="1"/>
+          </p:cNvPicPr>
+          <p:nvPr/>
+        </p:nvPicPr>
+        <p:blipFill>
+          <a:blip r:embed="rId4"/>
+          <a:stretch>
+            <a:fillRect/>
+          </a:stretch>
+        </p:blipFill>
+        <p:spPr>
+          <a:xfrm>
+            <a:off x="182880" y="5760720"/>
+            <a:ext cx="3657600" cy="2252778"/>
+          </a:xfrm>
+          <a:prstGeom prst="rect">
+            <a:avLst/>
+          </a:prstGeom>
+        </p:spPr>
+      </p:pic>
+      <p:pic>
+        <p:nvPicPr>
+          <p:cNvPr id="7" name="Picture 6" descr="גרף_השכלה_מחוז דרום.png"/>
+          <p:cNvPicPr>
+            <a:picLocks noChangeAspect="1"/>
+          </p:cNvPicPr>
+          <p:nvPr/>
+        </p:nvPicPr>
+        <p:blipFill>
+          <a:blip r:embed="rId5"/>
+          <a:stretch>
+            <a:fillRect/>
+          </a:stretch>
+        </p:blipFill>
+        <p:spPr>
+          <a:xfrm>
+            <a:off x="4876800" y="1371600"/>
+            <a:ext cx="4876800" cy="4139948"/>
+          </a:xfrm>
+          <a:prstGeom prst="rect">
+            <a:avLst/>
+          </a:prstGeom>
+        </p:spPr>
+      </p:pic>
+      <p:sp>
+        <p:nvSpPr>
+          <p:cNvPr id="8" name="TextBox 7"/>
+          <p:cNvSpPr txBox="1"/>
+          <p:nvPr/>
+        </p:nvSpPr>
+        <p:spPr>
+          <a:xfrm>
+            <a:off x="5394960" y="6858000"/>
+            <a:ext cx="9144000" cy="1371600"/>
+          </a:xfrm>
+          <a:prstGeom prst="rect">
+            <a:avLst/>
+          </a:prstGeom>
+          <a:noFill/>
+        </p:spPr>
+        <p:txBody>
+          <a:bodyPr wrap="none">
+            <a:spAutoFit/>
+          </a:bodyPr>
+          <a:lstStyle/>
+          <a:p/>
+          <a:p>
+            <a:pPr algn="r">
+              <a:defRPr sz="2500">
+                <a:solidFill>
+                  <a:srgbClr val="A9A9A9"/>
+                </a:solidFill>
+                <a:latin typeface="Ariel"/>
+              </a:defRPr>
+            </a:pPr>
+            <a:r>
+              <a:t>ניתן להכניס טקסט כאן</a:t>
+            </a:r>
+          </a:p>
+        </p:txBody>
+      </p:sp>
+      <p:pic>
+        <p:nvPicPr>
+          <p:cNvPr id="9" name="Picture 8" descr="רמת השכלה.png"/>
+          <p:cNvPicPr>
+            <a:picLocks noChangeAspect="1"/>
+          </p:cNvPicPr>
+          <p:nvPr/>
+        </p:nvPicPr>
+        <p:blipFill>
+          <a:blip r:embed="rId4"/>
+          <a:stretch>
+            <a:fillRect/>
+          </a:stretch>
+        </p:blipFill>
+        <p:spPr>
+          <a:xfrm>
+            <a:off x="182880" y="5760720"/>
+            <a:ext cx="3657600" cy="2252778"/>
+          </a:xfrm>
+          <a:prstGeom prst="rect">
+            <a:avLst/>
+          </a:prstGeom>
+        </p:spPr>
+      </p:pic>
+      <p:pic>
+        <p:nvPicPr>
+          <p:cNvPr id="10" name="Picture 9" descr="גרף_השכלה_לשכת אופקים.png"/>
+          <p:cNvPicPr>
+            <a:picLocks noChangeAspect="1"/>
+          </p:cNvPicPr>
+          <p:nvPr/>
+        </p:nvPicPr>
+        <p:blipFill>
+          <a:blip r:embed="rId6"/>
+          <a:stretch>
+            <a:fillRect/>
+          </a:stretch>
+        </p:blipFill>
+        <p:spPr>
+          <a:xfrm>
+            <a:off x="9753600" y="1371600"/>
+            <a:ext cx="4876800" cy="4232507"/>
+          </a:xfrm>
+          <a:prstGeom prst="rect">
+            <a:avLst/>
+          </a:prstGeom>
+        </p:spPr>
+      </p:pic>
+      <p:sp>
+        <p:nvSpPr>
+          <p:cNvPr id="11" name="TextBox 10"/>
+          <p:cNvSpPr txBox="1"/>
+          <p:nvPr/>
+        </p:nvSpPr>
+        <p:spPr>
+          <a:xfrm>
+            <a:off x="5394960" y="6858000"/>
+            <a:ext cx="9144000" cy="1371600"/>
+          </a:xfrm>
+          <a:prstGeom prst="rect">
+            <a:avLst/>
+          </a:prstGeom>
+          <a:noFill/>
+        </p:spPr>
+        <p:txBody>
+          <a:bodyPr wrap="none">
+            <a:spAutoFit/>
+          </a:bodyPr>
+          <a:lstStyle/>
+          <a:p/>
+          <a:p>
+            <a:pPr algn="r">
+              <a:defRPr sz="2500">
+                <a:solidFill>
+                  <a:srgbClr val="A9A9A9"/>
+                </a:solidFill>
+                <a:latin typeface="Ariel"/>
+              </a:defRPr>
+            </a:pPr>
+            <a:r>
+              <a:t>ניתן להכניס טקסט כאן</a:t>
+            </a:r>
+          </a:p>
+        </p:txBody>
+      </p:sp>
+      <p:pic>
+        <p:nvPicPr>
+          <p:cNvPr id="12" name="Picture 11" descr="רמת השכלה.png"/>
+          <p:cNvPicPr>
+            <a:picLocks noChangeAspect="1"/>
+          </p:cNvPicPr>
+          <p:nvPr/>
+        </p:nvPicPr>
+        <p:blipFill>
+          <a:blip r:embed="rId4"/>
+          <a:stretch>
+            <a:fillRect/>
+          </a:stretch>
+        </p:blipFill>
+        <p:spPr>
+          <a:xfrm>
+            <a:off x="182880" y="5760720"/>
+            <a:ext cx="3657600" cy="2252778"/>
           </a:xfrm>
           <a:prstGeom prst="rect">
             <a:avLst/>
@@ -3981,14 +4680,14 @@
               </a:defRPr>
             </a:pPr>
             <a:r>
-              <a:t>התפלגות משלחי היד - מבט כללי</a:t>
+              <a:t>התפלגות מצב משפחתי</a:t>
             </a:r>
           </a:p>
         </p:txBody>
       </p:sp>
       <p:pic>
         <p:nvPicPr>
-          <p:cNvPr id="4" name="Picture 3" descr="גרף_מקצועות.png"/>
+          <p:cNvPr id="4" name="Picture 3" descr="גרף_מצב_משפחתי.png"/>
           <p:cNvPicPr>
             <a:picLocks noChangeAspect="1"/>
           </p:cNvPicPr>
@@ -4002,8 +4701,111 @@
         </p:blipFill>
         <p:spPr>
           <a:xfrm>
-            <a:off x="1828800" y="1371600"/>
-            <a:ext cx="12527280" cy="7973713"/>
+            <a:off x="2743200" y="1645920"/>
+            <a:ext cx="9563536" cy="5029200"/>
+          </a:xfrm>
+          <a:prstGeom prst="rect">
+            <a:avLst/>
+          </a:prstGeom>
+        </p:spPr>
+      </p:pic>
+    </p:spTree>
+  </p:cSld>
+  <p:clrMapOvr>
+    <a:masterClrMapping/>
+  </p:clrMapOvr>
+</p:sld>
+</file>
+
+<file path=ppt/slides/slide9.xml><?xml version="1.0" encoding="utf-8"?>
+<p:sld xmlns:a="http://schemas.openxmlformats.org/drawingml/2006/main" xmlns:p="http://schemas.openxmlformats.org/presentationml/2006/main" xmlns:r="http://schemas.openxmlformats.org/officeDocument/2006/relationships">
+  <p:cSld>
+    <p:spTree>
+      <p:nvGrpSpPr>
+        <p:cNvPr id="1" name=""/>
+        <p:cNvGrpSpPr/>
+        <p:nvPr/>
+      </p:nvGrpSpPr>
+      <p:grpSpPr/>
+      <p:pic>
+        <p:nvPicPr>
+          <p:cNvPr id="2" name="Picture 1" descr="bck_all_slide.png"/>
+          <p:cNvPicPr>
+            <a:picLocks noChangeAspect="1"/>
+          </p:cNvPicPr>
+          <p:nvPr/>
+        </p:nvPicPr>
+        <p:blipFill>
+          <a:blip r:embed="rId2"/>
+          <a:stretch>
+            <a:fillRect/>
+          </a:stretch>
+        </p:blipFill>
+        <p:spPr>
+          <a:xfrm>
+            <a:off x="0" y="0"/>
+            <a:ext cx="14630400" cy="8229600"/>
+          </a:xfrm>
+          <a:prstGeom prst="rect">
+            <a:avLst/>
+          </a:prstGeom>
+        </p:spPr>
+      </p:pic>
+      <p:sp>
+        <p:nvSpPr>
+          <p:cNvPr id="3" name="TextBox 2"/>
+          <p:cNvSpPr txBox="1"/>
+          <p:nvPr/>
+        </p:nvSpPr>
+        <p:spPr>
+          <a:xfrm>
+            <a:off x="6858000" y="91440"/>
+            <a:ext cx="7315200" cy="914400"/>
+          </a:xfrm>
+          <a:prstGeom prst="rect">
+            <a:avLst/>
+          </a:prstGeom>
+          <a:noFill/>
+        </p:spPr>
+        <p:txBody>
+          <a:bodyPr wrap="none">
+            <a:spAutoFit/>
+          </a:bodyPr>
+          <a:lstStyle/>
+          <a:p/>
+          <a:p>
+            <a:pPr algn="r">
+              <a:defRPr sz="3800" b="1">
+                <a:solidFill>
+                  <a:srgbClr val="FFFFFF"/>
+                </a:solidFill>
+                <a:latin typeface="Ariel"/>
+              </a:defRPr>
+            </a:pPr>
+            <a:r>
+              <a:t>18התפלגות כמות ילדים מתחת לגיל </a:t>
+            </a:r>
+          </a:p>
+        </p:txBody>
+      </p:sp>
+      <p:pic>
+        <p:nvPicPr>
+          <p:cNvPr id="4" name="Picture 3" descr="גרף_כמות_ילדים.png"/>
+          <p:cNvPicPr>
+            <a:picLocks noChangeAspect="1"/>
+          </p:cNvPicPr>
+          <p:nvPr/>
+        </p:nvPicPr>
+        <p:blipFill>
+          <a:blip r:embed="rId3"/>
+          <a:stretch>
+            <a:fillRect/>
+          </a:stretch>
+        </p:blipFill>
+        <p:spPr>
+          <a:xfrm>
+            <a:off x="2743200" y="1371600"/>
+            <a:ext cx="10789920" cy="5207567"/>
           </a:xfrm>
           <a:prstGeom prst="rect">
             <a:avLst/>

</xml_diff>